<commit_message>
new folder names and day1c draft
</commit_message>
<xml_diff>
--- a/figs/sw_figs.pptx
+++ b/figs/sw_figs.pptx
@@ -3588,596 +3588,894 @@
           <a:chExt cx="0" cy="0"/>
         </a:xfrm>
       </p:grpSpPr>
-      <p:pic>
-        <p:nvPicPr>
-          <p:cNvPr id="9" name="Graphic 8">
-            <a:extLst>
-              <a:ext uri="{FF2B5EF4-FFF2-40B4-BE49-F238E27FC236}">
-                <a16:creationId xmlns:a16="http://schemas.microsoft.com/office/drawing/2014/main" id="{B2D78D1B-82A9-6639-C248-A2886CE1B64C}"/>
-              </a:ext>
-            </a:extLst>
-          </p:cNvPr>
-          <p:cNvPicPr>
-            <a:picLocks noChangeAspect="1"/>
-          </p:cNvPicPr>
+      <p:grpSp>
+        <p:nvGrpSpPr>
+          <p:cNvPr id="30" name="Group 29">
+            <a:extLst>
+              <a:ext uri="{FF2B5EF4-FFF2-40B4-BE49-F238E27FC236}">
+                <a16:creationId xmlns:a16="http://schemas.microsoft.com/office/drawing/2014/main" id="{46BCDBA2-E8DF-90CA-0740-E2EF1098D759}"/>
+              </a:ext>
+            </a:extLst>
+          </p:cNvPr>
+          <p:cNvGrpSpPr/>
           <p:nvPr/>
-        </p:nvPicPr>
-        <p:blipFill>
-          <a:blip r:embed="rId2">
-            <a:extLst>
-              <a:ext uri="{96DAC541-7B7A-43D3-8B79-37D633B846F1}">
-                <asvg:svgBlip xmlns:asvg="http://schemas.microsoft.com/office/drawing/2016/SVG/main" r:embed="rId3"/>
-              </a:ext>
-            </a:extLst>
-          </a:blip>
-          <a:stretch>
-            <a:fillRect/>
-          </a:stretch>
-        </p:blipFill>
-        <p:spPr>
-          <a:xfrm>
-            <a:off x="6237146" y="1335120"/>
-            <a:ext cx="3041650" cy="3281998"/>
-          </a:xfrm>
-          <a:prstGeom prst="rect">
-            <a:avLst/>
-          </a:prstGeom>
-        </p:spPr>
-      </p:pic>
-      <p:sp>
-        <p:nvSpPr>
-          <p:cNvPr id="11" name="Rectangle 10">
-            <a:extLst>
-              <a:ext uri="{FF2B5EF4-FFF2-40B4-BE49-F238E27FC236}">
-                <a16:creationId xmlns:a16="http://schemas.microsoft.com/office/drawing/2014/main" id="{39407558-A951-F1A8-7966-3985F9C30C79}"/>
-              </a:ext>
-            </a:extLst>
-          </p:cNvPr>
-          <p:cNvSpPr/>
-          <p:nvPr/>
-        </p:nvSpPr>
-        <p:spPr>
+        </p:nvGrpSpPr>
+        <p:grpSpPr>
           <a:xfrm>
             <a:off x="339845" y="880619"/>
             <a:ext cx="2794000" cy="4191000"/>
+            <a:chOff x="339845" y="880619"/>
+            <a:chExt cx="2794000" cy="4191000"/>
           </a:xfrm>
-          <a:prstGeom prst="rect">
-            <a:avLst/>
-          </a:prstGeom>
-          <a:solidFill>
-            <a:schemeClr val="bg2"/>
-          </a:solidFill>
-          <a:ln w="28575">
+        </p:grpSpPr>
+        <p:sp>
+          <p:nvSpPr>
+            <p:cNvPr id="11" name="Rectangle 10">
+              <a:extLst>
+                <a:ext uri="{FF2B5EF4-FFF2-40B4-BE49-F238E27FC236}">
+                  <a16:creationId xmlns:a16="http://schemas.microsoft.com/office/drawing/2014/main" id="{39407558-A951-F1A8-7966-3985F9C30C79}"/>
+                </a:ext>
+              </a:extLst>
+            </p:cNvPr>
+            <p:cNvSpPr/>
+            <p:nvPr/>
+          </p:nvSpPr>
+          <p:spPr>
+            <a:xfrm>
+              <a:off x="339845" y="880619"/>
+              <a:ext cx="2794000" cy="4191000"/>
+            </a:xfrm>
+            <a:prstGeom prst="rect">
+              <a:avLst/>
+            </a:prstGeom>
             <a:solidFill>
+              <a:schemeClr val="bg1">
+                <a:lumMod val="95000"/>
+              </a:schemeClr>
+            </a:solidFill>
+            <a:ln w="28575">
+              <a:solidFill>
+                <a:schemeClr val="tx1"/>
+              </a:solidFill>
+            </a:ln>
+          </p:spPr>
+          <p:style>
+            <a:lnRef idx="2">
+              <a:schemeClr val="accent1">
+                <a:shade val="50000"/>
+              </a:schemeClr>
+            </a:lnRef>
+            <a:fillRef idx="1">
+              <a:schemeClr val="accent1"/>
+            </a:fillRef>
+            <a:effectRef idx="0">
+              <a:schemeClr val="accent1"/>
+            </a:effectRef>
+            <a:fontRef idx="minor">
+              <a:schemeClr val="lt1"/>
+            </a:fontRef>
+          </p:style>
+          <p:txBody>
+            <a:bodyPr rtlCol="0" anchor="ctr"/>
+            <a:lstStyle/>
+            <a:p>
+              <a:pPr algn="ctr"/>
+              <a:endParaRPr lang="en-US"/>
+            </a:p>
+          </p:txBody>
+        </p:sp>
+        <p:sp>
+          <p:nvSpPr>
+            <p:cNvPr id="10" name="Oval 9">
+              <a:extLst>
+                <a:ext uri="{FF2B5EF4-FFF2-40B4-BE49-F238E27FC236}">
+                  <a16:creationId xmlns:a16="http://schemas.microsoft.com/office/drawing/2014/main" id="{CDB774D5-00D5-EFE6-F708-548858EED307}"/>
+                </a:ext>
+              </a:extLst>
+            </p:cNvPr>
+            <p:cNvSpPr/>
+            <p:nvPr/>
+          </p:nvSpPr>
+          <p:spPr>
+            <a:xfrm>
+              <a:off x="1372242" y="1111170"/>
+              <a:ext cx="925974" cy="821802"/>
+            </a:xfrm>
+            <a:prstGeom prst="ellipse">
+              <a:avLst/>
+            </a:prstGeom>
+            <a:solidFill>
+              <a:schemeClr val="bg1"/>
+            </a:solidFill>
+            <a:ln>
+              <a:solidFill>
+                <a:schemeClr val="tx1"/>
+              </a:solidFill>
+            </a:ln>
+          </p:spPr>
+          <p:style>
+            <a:lnRef idx="2">
+              <a:schemeClr val="accent1">
+                <a:shade val="50000"/>
+              </a:schemeClr>
+            </a:lnRef>
+            <a:fillRef idx="1">
+              <a:schemeClr val="accent1"/>
+            </a:fillRef>
+            <a:effectRef idx="0">
+              <a:schemeClr val="accent1"/>
+            </a:effectRef>
+            <a:fontRef idx="minor">
+              <a:schemeClr val="lt1"/>
+            </a:fontRef>
+          </p:style>
+          <p:txBody>
+            <a:bodyPr rtlCol="0" anchor="ctr"/>
+            <a:lstStyle/>
+            <a:p>
+              <a:pPr algn="ctr"/>
+              <a:r>
+                <a:rPr lang="en-US" sz="1100" dirty="0">
+                  <a:solidFill>
+                    <a:schemeClr val="tx1"/>
+                  </a:solidFill>
+                  <a:latin typeface="Open Sauce Sans" pitchFamily="2" charset="77"/>
+                </a:rPr>
+                <a:t>All Data</a:t>
+              </a:r>
+            </a:p>
+          </p:txBody>
+        </p:sp>
+        <p:sp>
+          <p:nvSpPr>
+            <p:cNvPr id="13" name="Hexagon 12">
+              <a:extLst>
+                <a:ext uri="{FF2B5EF4-FFF2-40B4-BE49-F238E27FC236}">
+                  <a16:creationId xmlns:a16="http://schemas.microsoft.com/office/drawing/2014/main" id="{1E6B42FC-754E-E5FC-4005-642171666F81}"/>
+                </a:ext>
+              </a:extLst>
+            </p:cNvPr>
+            <p:cNvSpPr/>
+            <p:nvPr/>
+          </p:nvSpPr>
+          <p:spPr>
+            <a:xfrm>
+              <a:off x="1001892" y="2385811"/>
+              <a:ext cx="792622" cy="640080"/>
+            </a:xfrm>
+            <a:prstGeom prst="hexagon">
+              <a:avLst/>
+            </a:prstGeom>
+            <a:solidFill>
+              <a:schemeClr val="bg2">
+                <a:lumMod val="75000"/>
+              </a:schemeClr>
+            </a:solidFill>
+            <a:ln>
+              <a:solidFill>
+                <a:schemeClr val="tx1"/>
+              </a:solidFill>
+            </a:ln>
+          </p:spPr>
+          <p:style>
+            <a:lnRef idx="2">
+              <a:schemeClr val="accent1">
+                <a:shade val="50000"/>
+              </a:schemeClr>
+            </a:lnRef>
+            <a:fillRef idx="1">
+              <a:schemeClr val="accent1"/>
+            </a:fillRef>
+            <a:effectRef idx="0">
+              <a:schemeClr val="accent1"/>
+            </a:effectRef>
+            <a:fontRef idx="minor">
+              <a:schemeClr val="lt1"/>
+            </a:fontRef>
+          </p:style>
+          <p:txBody>
+            <a:bodyPr lIns="0" rIns="0" rtlCol="0" anchor="ctr"/>
+            <a:lstStyle/>
+            <a:p>
+              <a:pPr algn="ctr"/>
+              <a:r>
+                <a:rPr lang="en-US" sz="1100" dirty="0">
+                  <a:solidFill>
+                    <a:schemeClr val="tx1"/>
+                  </a:solidFill>
+                  <a:latin typeface="Open Sauce Sans" pitchFamily="2" charset="77"/>
+                </a:rPr>
+                <a:t>Not Testing</a:t>
+              </a:r>
+            </a:p>
+          </p:txBody>
+        </p:sp>
+        <p:sp>
+          <p:nvSpPr>
+            <p:cNvPr id="15" name="Hexagon 14">
+              <a:extLst>
+                <a:ext uri="{FF2B5EF4-FFF2-40B4-BE49-F238E27FC236}">
+                  <a16:creationId xmlns:a16="http://schemas.microsoft.com/office/drawing/2014/main" id="{5A668840-6529-E228-BB29-02DDC1022A00}"/>
+                </a:ext>
+              </a:extLst>
+            </p:cNvPr>
+            <p:cNvSpPr/>
+            <p:nvPr/>
+          </p:nvSpPr>
+          <p:spPr>
+            <a:xfrm>
+              <a:off x="1873691" y="2385811"/>
+              <a:ext cx="792621" cy="640080"/>
+            </a:xfrm>
+            <a:prstGeom prst="hexagon">
+              <a:avLst/>
+            </a:prstGeom>
+            <a:solidFill>
+              <a:schemeClr val="accent6">
+                <a:lumMod val="40000"/>
+                <a:lumOff val="60000"/>
+              </a:schemeClr>
+            </a:solidFill>
+            <a:ln>
+              <a:solidFill>
+                <a:schemeClr val="tx1"/>
+              </a:solidFill>
+            </a:ln>
+          </p:spPr>
+          <p:style>
+            <a:lnRef idx="2">
+              <a:schemeClr val="accent1">
+                <a:shade val="50000"/>
+              </a:schemeClr>
+            </a:lnRef>
+            <a:fillRef idx="1">
+              <a:schemeClr val="accent1"/>
+            </a:fillRef>
+            <a:effectRef idx="0">
+              <a:schemeClr val="accent1"/>
+            </a:effectRef>
+            <a:fontRef idx="minor">
+              <a:schemeClr val="lt1"/>
+            </a:fontRef>
+          </p:style>
+          <p:txBody>
+            <a:bodyPr lIns="0" rIns="0" rtlCol="0" anchor="ctr"/>
+            <a:lstStyle/>
+            <a:p>
+              <a:pPr algn="ctr"/>
+              <a:r>
+                <a:rPr lang="en-US" sz="1100" dirty="0">
+                  <a:solidFill>
+                    <a:schemeClr val="tx1"/>
+                  </a:solidFill>
+                  <a:latin typeface="Open Sauce Sans" pitchFamily="2" charset="77"/>
+                </a:rPr>
+                <a:t>Testing</a:t>
+              </a:r>
+            </a:p>
+          </p:txBody>
+        </p:sp>
+        <p:sp>
+          <p:nvSpPr>
+            <p:cNvPr id="16" name="Oval 15">
+              <a:extLst>
+                <a:ext uri="{FF2B5EF4-FFF2-40B4-BE49-F238E27FC236}">
+                  <a16:creationId xmlns:a16="http://schemas.microsoft.com/office/drawing/2014/main" id="{5C26A799-AAFF-B36E-7718-2019C04866E5}"/>
+                </a:ext>
+              </a:extLst>
+            </p:cNvPr>
+            <p:cNvSpPr/>
+            <p:nvPr/>
+          </p:nvSpPr>
+          <p:spPr>
+            <a:xfrm>
+              <a:off x="393536" y="3774048"/>
+              <a:ext cx="950976" cy="594360"/>
+            </a:xfrm>
+            <a:prstGeom prst="ellipse">
+              <a:avLst/>
+            </a:prstGeom>
+            <a:solidFill>
+              <a:schemeClr val="accent5">
+                <a:lumMod val="40000"/>
+                <a:lumOff val="60000"/>
+              </a:schemeClr>
+            </a:solidFill>
+            <a:ln>
+              <a:solidFill>
+                <a:schemeClr val="tx1"/>
+              </a:solidFill>
+            </a:ln>
+          </p:spPr>
+          <p:style>
+            <a:lnRef idx="2">
+              <a:schemeClr val="accent1">
+                <a:shade val="50000"/>
+              </a:schemeClr>
+            </a:lnRef>
+            <a:fillRef idx="1">
+              <a:schemeClr val="accent1"/>
+            </a:fillRef>
+            <a:effectRef idx="0">
+              <a:schemeClr val="accent1"/>
+            </a:effectRef>
+            <a:fontRef idx="minor">
+              <a:schemeClr val="lt1"/>
+            </a:fontRef>
+          </p:style>
+          <p:txBody>
+            <a:bodyPr lIns="0" rIns="0" rtlCol="0" anchor="ctr"/>
+            <a:lstStyle/>
+            <a:p>
+              <a:pPr algn="ctr"/>
+              <a:r>
+                <a:rPr lang="en-US" sz="1100" dirty="0">
+                  <a:solidFill>
+                    <a:schemeClr val="tx1"/>
+                  </a:solidFill>
+                  <a:latin typeface="Open Sauce Sans" pitchFamily="2" charset="77"/>
+                </a:rPr>
+                <a:t>Training</a:t>
+              </a:r>
+            </a:p>
+          </p:txBody>
+        </p:sp>
+        <p:sp>
+          <p:nvSpPr>
+            <p:cNvPr id="17" name="Oval 16">
+              <a:extLst>
+                <a:ext uri="{FF2B5EF4-FFF2-40B4-BE49-F238E27FC236}">
+                  <a16:creationId xmlns:a16="http://schemas.microsoft.com/office/drawing/2014/main" id="{9821A89E-164C-FBBB-1596-B3299DBC18B9}"/>
+                </a:ext>
+              </a:extLst>
+            </p:cNvPr>
+            <p:cNvSpPr/>
+            <p:nvPr/>
+          </p:nvSpPr>
+          <p:spPr>
+            <a:xfrm>
+              <a:off x="1398203" y="3774048"/>
+              <a:ext cx="950976" cy="594360"/>
+            </a:xfrm>
+            <a:prstGeom prst="ellipse">
+              <a:avLst/>
+            </a:prstGeom>
+            <a:solidFill>
+              <a:schemeClr val="accent2">
+                <a:lumMod val="40000"/>
+                <a:lumOff val="60000"/>
+              </a:schemeClr>
+            </a:solidFill>
+            <a:ln>
+              <a:solidFill>
+                <a:schemeClr val="tx1"/>
+              </a:solidFill>
+            </a:ln>
+          </p:spPr>
+          <p:style>
+            <a:lnRef idx="2">
+              <a:schemeClr val="accent1">
+                <a:shade val="50000"/>
+              </a:schemeClr>
+            </a:lnRef>
+            <a:fillRef idx="1">
+              <a:schemeClr val="accent1"/>
+            </a:fillRef>
+            <a:effectRef idx="0">
+              <a:schemeClr val="accent1"/>
+            </a:effectRef>
+            <a:fontRef idx="minor">
+              <a:schemeClr val="lt1"/>
+            </a:fontRef>
+          </p:style>
+          <p:txBody>
+            <a:bodyPr lIns="0" rIns="0" rtlCol="0" anchor="ctr"/>
+            <a:lstStyle/>
+            <a:p>
+              <a:pPr algn="ctr"/>
+              <a:r>
+                <a:rPr lang="en-US" sz="1100" dirty="0">
+                  <a:solidFill>
+                    <a:schemeClr val="tx1"/>
+                  </a:solidFill>
+                  <a:latin typeface="Open Sauce Sans" pitchFamily="2" charset="77"/>
+                </a:rPr>
+                <a:t>Validation</a:t>
+              </a:r>
+            </a:p>
+          </p:txBody>
+        </p:sp>
+        <p:cxnSp>
+          <p:nvCxnSpPr>
+            <p:cNvPr id="18" name="Straight Arrow Connector 17">
+              <a:extLst>
+                <a:ext uri="{FF2B5EF4-FFF2-40B4-BE49-F238E27FC236}">
+                  <a16:creationId xmlns:a16="http://schemas.microsoft.com/office/drawing/2014/main" id="{21EB47B6-3A86-53CA-40ED-42D93730C8EB}"/>
+                </a:ext>
+              </a:extLst>
+            </p:cNvPr>
+            <p:cNvCxnSpPr>
+              <a:cxnSpLocks/>
+              <a:stCxn id="10" idx="4"/>
+            </p:cNvCxnSpPr>
+            <p:nvPr/>
+          </p:nvCxnSpPr>
+          <p:spPr>
+            <a:xfrm flipH="1">
+              <a:off x="1398203" y="1932972"/>
+              <a:ext cx="437026" cy="452839"/>
+            </a:xfrm>
+            <a:prstGeom prst="straightConnector1">
+              <a:avLst/>
+            </a:prstGeom>
+            <a:ln>
+              <a:solidFill>
+                <a:schemeClr val="tx1"/>
+              </a:solidFill>
+              <a:tailEnd type="triangle"/>
+            </a:ln>
+          </p:spPr>
+          <p:style>
+            <a:lnRef idx="1">
+              <a:schemeClr val="accent1"/>
+            </a:lnRef>
+            <a:fillRef idx="0">
+              <a:schemeClr val="accent1"/>
+            </a:fillRef>
+            <a:effectRef idx="0">
+              <a:schemeClr val="accent1"/>
+            </a:effectRef>
+            <a:fontRef idx="minor">
               <a:schemeClr val="tx1"/>
+            </a:fontRef>
+          </p:style>
+        </p:cxnSp>
+        <p:cxnSp>
+          <p:nvCxnSpPr>
+            <p:cNvPr id="21" name="Straight Arrow Connector 20">
+              <a:extLst>
+                <a:ext uri="{FF2B5EF4-FFF2-40B4-BE49-F238E27FC236}">
+                  <a16:creationId xmlns:a16="http://schemas.microsoft.com/office/drawing/2014/main" id="{59D52875-0D27-5262-64E2-7055DCE26CF5}"/>
+                </a:ext>
+              </a:extLst>
+            </p:cNvPr>
+            <p:cNvCxnSpPr>
+              <a:cxnSpLocks/>
+            </p:cNvCxnSpPr>
+            <p:nvPr/>
+          </p:nvCxnSpPr>
+          <p:spPr>
+            <a:xfrm>
+              <a:off x="1832976" y="1932972"/>
+              <a:ext cx="437025" cy="452839"/>
+            </a:xfrm>
+            <a:prstGeom prst="straightConnector1">
+              <a:avLst/>
+            </a:prstGeom>
+            <a:ln>
+              <a:solidFill>
+                <a:schemeClr val="tx1"/>
+              </a:solidFill>
+              <a:tailEnd type="triangle"/>
+            </a:ln>
+          </p:spPr>
+          <p:style>
+            <a:lnRef idx="1">
+              <a:schemeClr val="accent1"/>
+            </a:lnRef>
+            <a:fillRef idx="0">
+              <a:schemeClr val="accent1"/>
+            </a:fillRef>
+            <a:effectRef idx="0">
+              <a:schemeClr val="accent1"/>
+            </a:effectRef>
+            <a:fontRef idx="minor">
+              <a:schemeClr val="tx1"/>
+            </a:fontRef>
+          </p:style>
+        </p:cxnSp>
+        <p:cxnSp>
+          <p:nvCxnSpPr>
+            <p:cNvPr id="24" name="Straight Arrow Connector 23">
+              <a:extLst>
+                <a:ext uri="{FF2B5EF4-FFF2-40B4-BE49-F238E27FC236}">
+                  <a16:creationId xmlns:a16="http://schemas.microsoft.com/office/drawing/2014/main" id="{9C7C4CFA-6FF9-7CE0-B742-34308C53DD61}"/>
+                </a:ext>
+              </a:extLst>
+            </p:cNvPr>
+            <p:cNvCxnSpPr>
+              <a:cxnSpLocks/>
+              <a:endCxn id="16" idx="0"/>
+            </p:cNvCxnSpPr>
+            <p:nvPr/>
+          </p:nvCxnSpPr>
+          <p:spPr>
+            <a:xfrm flipH="1">
+              <a:off x="869024" y="3025891"/>
+              <a:ext cx="500964" cy="748157"/>
+            </a:xfrm>
+            <a:prstGeom prst="straightConnector1">
+              <a:avLst/>
+            </a:prstGeom>
+            <a:ln>
+              <a:solidFill>
+                <a:schemeClr val="tx1"/>
+              </a:solidFill>
+              <a:tailEnd type="triangle"/>
+            </a:ln>
+          </p:spPr>
+          <p:style>
+            <a:lnRef idx="1">
+              <a:schemeClr val="accent1"/>
+            </a:lnRef>
+            <a:fillRef idx="0">
+              <a:schemeClr val="accent1"/>
+            </a:fillRef>
+            <a:effectRef idx="0">
+              <a:schemeClr val="accent1"/>
+            </a:effectRef>
+            <a:fontRef idx="minor">
+              <a:schemeClr val="tx1"/>
+            </a:fontRef>
+          </p:style>
+        </p:cxnSp>
+        <p:cxnSp>
+          <p:nvCxnSpPr>
+            <p:cNvPr id="27" name="Straight Arrow Connector 26">
+              <a:extLst>
+                <a:ext uri="{FF2B5EF4-FFF2-40B4-BE49-F238E27FC236}">
+                  <a16:creationId xmlns:a16="http://schemas.microsoft.com/office/drawing/2014/main" id="{A8976842-4374-5636-2398-34D529A3D957}"/>
+                </a:ext>
+              </a:extLst>
+            </p:cNvPr>
+            <p:cNvCxnSpPr>
+              <a:cxnSpLocks/>
+              <a:endCxn id="17" idx="0"/>
+            </p:cNvCxnSpPr>
+            <p:nvPr/>
+          </p:nvCxnSpPr>
+          <p:spPr>
+            <a:xfrm>
+              <a:off x="1384095" y="3038949"/>
+              <a:ext cx="489596" cy="735099"/>
+            </a:xfrm>
+            <a:prstGeom prst="straightConnector1">
+              <a:avLst/>
+            </a:prstGeom>
+            <a:ln>
+              <a:solidFill>
+                <a:schemeClr val="tx1"/>
+              </a:solidFill>
+              <a:tailEnd type="triangle"/>
+            </a:ln>
+          </p:spPr>
+          <p:style>
+            <a:lnRef idx="1">
+              <a:schemeClr val="accent1"/>
+            </a:lnRef>
+            <a:fillRef idx="0">
+              <a:schemeClr val="accent1"/>
+            </a:fillRef>
+            <a:effectRef idx="0">
+              <a:schemeClr val="accent1"/>
+            </a:effectRef>
+            <a:fontRef idx="minor">
+              <a:schemeClr val="tx1"/>
+            </a:fontRef>
+          </p:style>
+        </p:cxnSp>
+      </p:grpSp>
+      <p:grpSp>
+        <p:nvGrpSpPr>
+          <p:cNvPr id="1025" name="Group 1024">
+            <a:extLst>
+              <a:ext uri="{FF2B5EF4-FFF2-40B4-BE49-F238E27FC236}">
+                <a16:creationId xmlns:a16="http://schemas.microsoft.com/office/drawing/2014/main" id="{A4A7892D-4EB8-03F1-E9CA-ADD7C111E960}"/>
+              </a:ext>
+            </a:extLst>
+          </p:cNvPr>
+          <p:cNvGrpSpPr/>
+          <p:nvPr/>
+        </p:nvGrpSpPr>
+        <p:grpSpPr>
+          <a:xfrm>
+            <a:off x="3530156" y="880619"/>
+            <a:ext cx="2794000" cy="4191000"/>
+            <a:chOff x="3530156" y="880619"/>
+            <a:chExt cx="2794000" cy="4191000"/>
+          </a:xfrm>
+        </p:grpSpPr>
+        <p:sp>
+          <p:nvSpPr>
+            <p:cNvPr id="32" name="Rectangle 31">
+              <a:extLst>
+                <a:ext uri="{FF2B5EF4-FFF2-40B4-BE49-F238E27FC236}">
+                  <a16:creationId xmlns:a16="http://schemas.microsoft.com/office/drawing/2014/main" id="{100DC892-5624-76DE-7903-0F00DEEEC71C}"/>
+                </a:ext>
+              </a:extLst>
+            </p:cNvPr>
+            <p:cNvSpPr/>
+            <p:nvPr/>
+          </p:nvSpPr>
+          <p:spPr>
+            <a:xfrm>
+              <a:off x="3530156" y="880619"/>
+              <a:ext cx="2794000" cy="4191000"/>
+            </a:xfrm>
+            <a:prstGeom prst="rect">
+              <a:avLst/>
+            </a:prstGeom>
+            <a:solidFill>
+              <a:schemeClr val="bg1">
+                <a:lumMod val="95000"/>
+              </a:schemeClr>
             </a:solidFill>
-          </a:ln>
-        </p:spPr>
-        <p:style>
-          <a:lnRef idx="2">
-            <a:schemeClr val="accent1">
-              <a:shade val="50000"/>
-            </a:schemeClr>
-          </a:lnRef>
-          <a:fillRef idx="1">
-            <a:schemeClr val="accent1"/>
-          </a:fillRef>
-          <a:effectRef idx="0">
-            <a:schemeClr val="accent1"/>
-          </a:effectRef>
-          <a:fontRef idx="minor">
-            <a:schemeClr val="lt1"/>
-          </a:fontRef>
-        </p:style>
-        <p:txBody>
-          <a:bodyPr rtlCol="0" anchor="ctr"/>
-          <a:lstStyle/>
-          <a:p>
-            <a:pPr algn="ctr"/>
-            <a:endParaRPr lang="en-US"/>
-          </a:p>
-        </p:txBody>
-      </p:sp>
-      <p:sp>
-        <p:nvSpPr>
-          <p:cNvPr id="10" name="Oval 9">
-            <a:extLst>
-              <a:ext uri="{FF2B5EF4-FFF2-40B4-BE49-F238E27FC236}">
-                <a16:creationId xmlns:a16="http://schemas.microsoft.com/office/drawing/2014/main" id="{CDB774D5-00D5-EFE6-F708-548858EED307}"/>
-              </a:ext>
-            </a:extLst>
-          </p:cNvPr>
-          <p:cNvSpPr/>
-          <p:nvPr/>
-        </p:nvSpPr>
-        <p:spPr>
-          <a:xfrm>
-            <a:off x="1372242" y="1111170"/>
-            <a:ext cx="925974" cy="821802"/>
-          </a:xfrm>
-          <a:prstGeom prst="ellipse">
-            <a:avLst/>
-          </a:prstGeom>
-          <a:solidFill>
-            <a:schemeClr val="bg1"/>
-          </a:solidFill>
-          <a:ln>
-            <a:solidFill>
+            <a:ln w="28575">
+              <a:solidFill>
+                <a:schemeClr val="tx1"/>
+              </a:solidFill>
+            </a:ln>
+          </p:spPr>
+          <p:style>
+            <a:lnRef idx="2">
+              <a:schemeClr val="accent1">
+                <a:shade val="50000"/>
+              </a:schemeClr>
+            </a:lnRef>
+            <a:fillRef idx="1">
+              <a:schemeClr val="accent1"/>
+            </a:fillRef>
+            <a:effectRef idx="0">
+              <a:schemeClr val="accent1"/>
+            </a:effectRef>
+            <a:fontRef idx="minor">
+              <a:schemeClr val="lt1"/>
+            </a:fontRef>
+          </p:style>
+          <p:txBody>
+            <a:bodyPr rtlCol="0" anchor="ctr"/>
+            <a:lstStyle/>
+            <a:p>
+              <a:pPr algn="ctr"/>
+              <a:endParaRPr lang="en-US"/>
+            </a:p>
+          </p:txBody>
+        </p:sp>
+        <p:pic>
+          <p:nvPicPr>
+            <p:cNvPr id="33" name="Graphic 32" descr="Hospital with solid fill">
+              <a:extLst>
+                <a:ext uri="{FF2B5EF4-FFF2-40B4-BE49-F238E27FC236}">
+                  <a16:creationId xmlns:a16="http://schemas.microsoft.com/office/drawing/2014/main" id="{B74888B4-BDE7-EB4F-27F9-547DBED6AFA8}"/>
+                </a:ext>
+              </a:extLst>
+            </p:cNvPr>
+            <p:cNvPicPr>
+              <a:picLocks noChangeAspect="1"/>
+            </p:cNvPicPr>
+            <p:nvPr/>
+          </p:nvPicPr>
+          <p:blipFill>
+            <a:blip r:embed="rId2">
+              <a:extLst>
+                <a:ext uri="{96DAC541-7B7A-43D3-8B79-37D633B846F1}">
+                  <asvg:svgBlip xmlns:asvg="http://schemas.microsoft.com/office/drawing/2016/SVG/main" r:embed="rId3"/>
+                </a:ext>
+              </a:extLst>
+            </a:blip>
+            <a:stretch>
+              <a:fillRect/>
+            </a:stretch>
+          </p:blipFill>
+          <p:spPr>
+            <a:xfrm>
+              <a:off x="3723646" y="1292431"/>
+              <a:ext cx="1097280" cy="1097280"/>
+            </a:xfrm>
+            <a:prstGeom prst="rect">
+              <a:avLst/>
+            </a:prstGeom>
+          </p:spPr>
+        </p:pic>
+        <p:pic>
+          <p:nvPicPr>
+            <p:cNvPr id="37" name="Graphic 36" descr="Hospital with solid fill">
+              <a:extLst>
+                <a:ext uri="{FF2B5EF4-FFF2-40B4-BE49-F238E27FC236}">
+                  <a16:creationId xmlns:a16="http://schemas.microsoft.com/office/drawing/2014/main" id="{9C5FA5FB-17C4-9F4C-D94B-42863BD29CD3}"/>
+                </a:ext>
+              </a:extLst>
+            </p:cNvPr>
+            <p:cNvPicPr>
+              <a:picLocks noChangeAspect="1"/>
+            </p:cNvPicPr>
+            <p:nvPr/>
+          </p:nvPicPr>
+          <p:blipFill>
+            <a:blip r:embed="rId4">
+              <a:extLst>
+                <a:ext uri="{96DAC541-7B7A-43D3-8B79-37D633B846F1}">
+                  <asvg:svgBlip xmlns:asvg="http://schemas.microsoft.com/office/drawing/2016/SVG/main" r:embed="rId5"/>
+                </a:ext>
+              </a:extLst>
+            </a:blip>
+            <a:stretch>
+              <a:fillRect/>
+            </a:stretch>
+          </p:blipFill>
+          <p:spPr>
+            <a:xfrm>
+              <a:off x="5023901" y="1292431"/>
+              <a:ext cx="1097280" cy="1097280"/>
+            </a:xfrm>
+            <a:prstGeom prst="rect">
+              <a:avLst/>
+            </a:prstGeom>
+          </p:spPr>
+        </p:pic>
+        <p:pic>
+          <p:nvPicPr>
+            <p:cNvPr id="50" name="Graphic 49" descr="Group of people with solid fill">
+              <a:extLst>
+                <a:ext uri="{FF2B5EF4-FFF2-40B4-BE49-F238E27FC236}">
+                  <a16:creationId xmlns:a16="http://schemas.microsoft.com/office/drawing/2014/main" id="{2FEEE2DB-8D2E-568D-F239-75203CE2C4D2}"/>
+                </a:ext>
+              </a:extLst>
+            </p:cNvPr>
+            <p:cNvPicPr>
+              <a:picLocks noChangeAspect="1"/>
+            </p:cNvPicPr>
+            <p:nvPr/>
+          </p:nvPicPr>
+          <p:blipFill rotWithShape="1">
+            <a:blip r:embed="rId6">
+              <a:extLst>
+                <a:ext uri="{96DAC541-7B7A-43D3-8B79-37D633B846F1}">
+                  <asvg:svgBlip xmlns:asvg="http://schemas.microsoft.com/office/drawing/2016/SVG/main" r:embed="rId7"/>
+                </a:ext>
+              </a:extLst>
+            </a:blip>
+            <a:srcRect t="-5296" b="1"/>
+            <a:stretch/>
+          </p:blipFill>
+          <p:spPr>
+            <a:xfrm>
+              <a:off x="3632206" y="3119335"/>
+              <a:ext cx="1280160" cy="1347954"/>
+            </a:xfrm>
+            <a:prstGeom prst="rect">
+              <a:avLst/>
+            </a:prstGeom>
+          </p:spPr>
+        </p:pic>
+        <p:pic>
+          <p:nvPicPr>
+            <p:cNvPr id="52" name="Graphic 51" descr="Group of people with solid fill">
+              <a:extLst>
+                <a:ext uri="{FF2B5EF4-FFF2-40B4-BE49-F238E27FC236}">
+                  <a16:creationId xmlns:a16="http://schemas.microsoft.com/office/drawing/2014/main" id="{7A98B574-377B-CC9C-D183-44FB2CB2C871}"/>
+                </a:ext>
+              </a:extLst>
+            </p:cNvPr>
+            <p:cNvPicPr>
+              <a:picLocks noChangeAspect="1"/>
+            </p:cNvPicPr>
+            <p:nvPr/>
+          </p:nvPicPr>
+          <p:blipFill rotWithShape="1">
+            <a:blip r:embed="rId8">
+              <a:extLst>
+                <a:ext uri="{96DAC541-7B7A-43D3-8B79-37D633B846F1}">
+                  <asvg:svgBlip xmlns:asvg="http://schemas.microsoft.com/office/drawing/2016/SVG/main" r:embed="rId9"/>
+                </a:ext>
+              </a:extLst>
+            </a:blip>
+            <a:srcRect t="-5296" b="1"/>
+            <a:stretch/>
+          </p:blipFill>
+          <p:spPr>
+            <a:xfrm>
+              <a:off x="4932461" y="3119335"/>
+              <a:ext cx="1280160" cy="1347954"/>
+            </a:xfrm>
+            <a:prstGeom prst="rect">
+              <a:avLst/>
+            </a:prstGeom>
+          </p:spPr>
+        </p:pic>
+        <p:cxnSp>
+          <p:nvCxnSpPr>
+            <p:cNvPr id="53" name="Straight Arrow Connector 52">
+              <a:extLst>
+                <a:ext uri="{FF2B5EF4-FFF2-40B4-BE49-F238E27FC236}">
+                  <a16:creationId xmlns:a16="http://schemas.microsoft.com/office/drawing/2014/main" id="{7E638C06-0ADB-DD43-2FCF-D446A5F27AA6}"/>
+                </a:ext>
+              </a:extLst>
+            </p:cNvPr>
+            <p:cNvCxnSpPr>
+              <a:cxnSpLocks/>
+              <a:stCxn id="33" idx="2"/>
+              <a:endCxn id="50" idx="0"/>
+            </p:cNvCxnSpPr>
+            <p:nvPr/>
+          </p:nvCxnSpPr>
+          <p:spPr>
+            <a:xfrm>
+              <a:off x="4272286" y="2389711"/>
+              <a:ext cx="0" cy="729624"/>
+            </a:xfrm>
+            <a:prstGeom prst="straightConnector1">
+              <a:avLst/>
+            </a:prstGeom>
+            <a:ln w="28575">
+              <a:solidFill>
+                <a:schemeClr val="tx1"/>
+              </a:solidFill>
+              <a:tailEnd type="triangle"/>
+            </a:ln>
+          </p:spPr>
+          <p:style>
+            <a:lnRef idx="1">
+              <a:schemeClr val="accent1"/>
+            </a:lnRef>
+            <a:fillRef idx="0">
+              <a:schemeClr val="accent1"/>
+            </a:fillRef>
+            <a:effectRef idx="0">
+              <a:schemeClr val="accent1"/>
+            </a:effectRef>
+            <a:fontRef idx="minor">
               <a:schemeClr val="tx1"/>
-            </a:solidFill>
-          </a:ln>
-        </p:spPr>
-        <p:style>
-          <a:lnRef idx="2">
-            <a:schemeClr val="accent1">
-              <a:shade val="50000"/>
-            </a:schemeClr>
-          </a:lnRef>
-          <a:fillRef idx="1">
-            <a:schemeClr val="accent1"/>
-          </a:fillRef>
-          <a:effectRef idx="0">
-            <a:schemeClr val="accent1"/>
-          </a:effectRef>
-          <a:fontRef idx="minor">
-            <a:schemeClr val="lt1"/>
-          </a:fontRef>
-        </p:style>
-        <p:txBody>
-          <a:bodyPr rtlCol="0" anchor="ctr"/>
-          <a:lstStyle/>
-          <a:p>
-            <a:pPr algn="ctr"/>
-            <a:r>
-              <a:rPr lang="en-US" sz="1100" dirty="0">
-                <a:solidFill>
-                  <a:schemeClr val="tx1"/>
-                </a:solidFill>
-                <a:latin typeface="Open Sauce Sans" pitchFamily="2" charset="77"/>
-              </a:rPr>
-              <a:t>All Data</a:t>
-            </a:r>
-          </a:p>
-        </p:txBody>
-      </p:sp>
-      <p:sp>
-        <p:nvSpPr>
-          <p:cNvPr id="13" name="Hexagon 12">
-            <a:extLst>
-              <a:ext uri="{FF2B5EF4-FFF2-40B4-BE49-F238E27FC236}">
-                <a16:creationId xmlns:a16="http://schemas.microsoft.com/office/drawing/2014/main" id="{1E6B42FC-754E-E5FC-4005-642171666F81}"/>
-              </a:ext>
-            </a:extLst>
-          </p:cNvPr>
-          <p:cNvSpPr/>
-          <p:nvPr/>
-        </p:nvSpPr>
-        <p:spPr>
-          <a:xfrm>
-            <a:off x="1001892" y="2385811"/>
-            <a:ext cx="792622" cy="640080"/>
-          </a:xfrm>
-          <a:prstGeom prst="hexagon">
-            <a:avLst/>
-          </a:prstGeom>
-          <a:solidFill>
-            <a:schemeClr val="bg2">
-              <a:lumMod val="75000"/>
-            </a:schemeClr>
-          </a:solidFill>
-          <a:ln>
-            <a:solidFill>
+            </a:fontRef>
+          </p:style>
+        </p:cxnSp>
+        <p:cxnSp>
+          <p:nvCxnSpPr>
+            <p:cNvPr id="62" name="Straight Arrow Connector 61">
+              <a:extLst>
+                <a:ext uri="{FF2B5EF4-FFF2-40B4-BE49-F238E27FC236}">
+                  <a16:creationId xmlns:a16="http://schemas.microsoft.com/office/drawing/2014/main" id="{244C0B05-3F72-E60C-6C5E-07446E2448FC}"/>
+                </a:ext>
+              </a:extLst>
+            </p:cNvPr>
+            <p:cNvCxnSpPr>
+              <a:cxnSpLocks/>
+              <a:stCxn id="37" idx="2"/>
+              <a:endCxn id="52" idx="0"/>
+            </p:cNvCxnSpPr>
+            <p:nvPr/>
+          </p:nvCxnSpPr>
+          <p:spPr>
+            <a:xfrm>
+              <a:off x="5572541" y="2389711"/>
+              <a:ext cx="0" cy="729624"/>
+            </a:xfrm>
+            <a:prstGeom prst="straightConnector1">
+              <a:avLst/>
+            </a:prstGeom>
+            <a:ln w="28575">
+              <a:solidFill>
+                <a:schemeClr val="tx1"/>
+              </a:solidFill>
+              <a:tailEnd type="triangle"/>
+            </a:ln>
+          </p:spPr>
+          <p:style>
+            <a:lnRef idx="1">
+              <a:schemeClr val="accent1"/>
+            </a:lnRef>
+            <a:fillRef idx="0">
+              <a:schemeClr val="accent1"/>
+            </a:fillRef>
+            <a:effectRef idx="0">
+              <a:schemeClr val="accent1"/>
+            </a:effectRef>
+            <a:fontRef idx="minor">
               <a:schemeClr val="tx1"/>
-            </a:solidFill>
-          </a:ln>
-        </p:spPr>
-        <p:style>
-          <a:lnRef idx="2">
-            <a:schemeClr val="accent1">
-              <a:shade val="50000"/>
-            </a:schemeClr>
-          </a:lnRef>
-          <a:fillRef idx="1">
-            <a:schemeClr val="accent1"/>
-          </a:fillRef>
-          <a:effectRef idx="0">
-            <a:schemeClr val="accent1"/>
-          </a:effectRef>
-          <a:fontRef idx="minor">
-            <a:schemeClr val="lt1"/>
-          </a:fontRef>
-        </p:style>
-        <p:txBody>
-          <a:bodyPr lIns="0" rIns="0" rtlCol="0" anchor="ctr"/>
-          <a:lstStyle/>
-          <a:p>
-            <a:pPr algn="ctr"/>
-            <a:r>
-              <a:rPr lang="en-US" sz="1000" dirty="0">
-                <a:solidFill>
-                  <a:schemeClr val="tx1"/>
-                </a:solidFill>
-                <a:latin typeface="Open Sauce Sans" pitchFamily="2" charset="77"/>
-              </a:rPr>
-              <a:t>Not Testing</a:t>
-            </a:r>
-          </a:p>
-        </p:txBody>
-      </p:sp>
-      <p:sp>
-        <p:nvSpPr>
-          <p:cNvPr id="15" name="Hexagon 14">
-            <a:extLst>
-              <a:ext uri="{FF2B5EF4-FFF2-40B4-BE49-F238E27FC236}">
-                <a16:creationId xmlns:a16="http://schemas.microsoft.com/office/drawing/2014/main" id="{5A668840-6529-E228-BB29-02DDC1022A00}"/>
-              </a:ext>
-            </a:extLst>
-          </p:cNvPr>
-          <p:cNvSpPr/>
-          <p:nvPr/>
-        </p:nvSpPr>
-        <p:spPr>
-          <a:xfrm>
-            <a:off x="1873691" y="2385811"/>
-            <a:ext cx="792621" cy="640080"/>
-          </a:xfrm>
-          <a:prstGeom prst="hexagon">
-            <a:avLst/>
-          </a:prstGeom>
-          <a:solidFill>
-            <a:schemeClr val="accent6">
-              <a:lumMod val="40000"/>
-              <a:lumOff val="60000"/>
-            </a:schemeClr>
-          </a:solidFill>
-          <a:ln>
-            <a:solidFill>
-              <a:schemeClr val="tx1"/>
-            </a:solidFill>
-          </a:ln>
-        </p:spPr>
-        <p:style>
-          <a:lnRef idx="2">
-            <a:schemeClr val="accent1">
-              <a:shade val="50000"/>
-            </a:schemeClr>
-          </a:lnRef>
-          <a:fillRef idx="1">
-            <a:schemeClr val="accent1"/>
-          </a:fillRef>
-          <a:effectRef idx="0">
-            <a:schemeClr val="accent1"/>
-          </a:effectRef>
-          <a:fontRef idx="minor">
-            <a:schemeClr val="lt1"/>
-          </a:fontRef>
-        </p:style>
-        <p:txBody>
-          <a:bodyPr lIns="0" rIns="0" rtlCol="0" anchor="ctr"/>
-          <a:lstStyle/>
-          <a:p>
-            <a:pPr algn="ctr"/>
-            <a:r>
-              <a:rPr lang="en-US" sz="1000" dirty="0">
-                <a:solidFill>
-                  <a:schemeClr val="tx1"/>
-                </a:solidFill>
-                <a:latin typeface="Open Sauce Sans" pitchFamily="2" charset="77"/>
-              </a:rPr>
-              <a:t>Testing</a:t>
-            </a:r>
-          </a:p>
-        </p:txBody>
-      </p:sp>
-      <p:sp>
-        <p:nvSpPr>
-          <p:cNvPr id="16" name="Oval 15">
-            <a:extLst>
-              <a:ext uri="{FF2B5EF4-FFF2-40B4-BE49-F238E27FC236}">
-                <a16:creationId xmlns:a16="http://schemas.microsoft.com/office/drawing/2014/main" id="{5C26A799-AAFF-B36E-7718-2019C04866E5}"/>
-              </a:ext>
-            </a:extLst>
-          </p:cNvPr>
-          <p:cNvSpPr/>
-          <p:nvPr/>
-        </p:nvSpPr>
-        <p:spPr>
-          <a:xfrm>
-            <a:off x="393536" y="3774048"/>
-            <a:ext cx="950976" cy="594360"/>
-          </a:xfrm>
-          <a:prstGeom prst="ellipse">
-            <a:avLst/>
-          </a:prstGeom>
-          <a:solidFill>
-            <a:schemeClr val="accent5">
-              <a:lumMod val="40000"/>
-              <a:lumOff val="60000"/>
-            </a:schemeClr>
-          </a:solidFill>
-          <a:ln>
-            <a:solidFill>
-              <a:schemeClr val="tx1"/>
-            </a:solidFill>
-          </a:ln>
-        </p:spPr>
-        <p:style>
-          <a:lnRef idx="2">
-            <a:schemeClr val="accent1">
-              <a:shade val="50000"/>
-            </a:schemeClr>
-          </a:lnRef>
-          <a:fillRef idx="1">
-            <a:schemeClr val="accent1"/>
-          </a:fillRef>
-          <a:effectRef idx="0">
-            <a:schemeClr val="accent1"/>
-          </a:effectRef>
-          <a:fontRef idx="minor">
-            <a:schemeClr val="lt1"/>
-          </a:fontRef>
-        </p:style>
-        <p:txBody>
-          <a:bodyPr lIns="0" rIns="0" rtlCol="0" anchor="ctr"/>
-          <a:lstStyle/>
-          <a:p>
-            <a:pPr algn="ctr"/>
-            <a:r>
-              <a:rPr lang="en-US" sz="1100" dirty="0">
-                <a:solidFill>
-                  <a:schemeClr val="tx1"/>
-                </a:solidFill>
-                <a:latin typeface="Open Sauce Sans" pitchFamily="2" charset="77"/>
-              </a:rPr>
-              <a:t>Training</a:t>
-            </a:r>
-          </a:p>
-        </p:txBody>
-      </p:sp>
-      <p:sp>
-        <p:nvSpPr>
-          <p:cNvPr id="17" name="Oval 16">
-            <a:extLst>
-              <a:ext uri="{FF2B5EF4-FFF2-40B4-BE49-F238E27FC236}">
-                <a16:creationId xmlns:a16="http://schemas.microsoft.com/office/drawing/2014/main" id="{9821A89E-164C-FBBB-1596-B3299DBC18B9}"/>
-              </a:ext>
-            </a:extLst>
-          </p:cNvPr>
-          <p:cNvSpPr/>
-          <p:nvPr/>
-        </p:nvSpPr>
-        <p:spPr>
-          <a:xfrm>
-            <a:off x="1398203" y="3774048"/>
-            <a:ext cx="950976" cy="594360"/>
-          </a:xfrm>
-          <a:prstGeom prst="ellipse">
-            <a:avLst/>
-          </a:prstGeom>
-          <a:solidFill>
-            <a:schemeClr val="accent2">
-              <a:lumMod val="40000"/>
-              <a:lumOff val="60000"/>
-            </a:schemeClr>
-          </a:solidFill>
-          <a:ln>
-            <a:solidFill>
-              <a:schemeClr val="tx1"/>
-            </a:solidFill>
-          </a:ln>
-        </p:spPr>
-        <p:style>
-          <a:lnRef idx="2">
-            <a:schemeClr val="accent1">
-              <a:shade val="50000"/>
-            </a:schemeClr>
-          </a:lnRef>
-          <a:fillRef idx="1">
-            <a:schemeClr val="accent1"/>
-          </a:fillRef>
-          <a:effectRef idx="0">
-            <a:schemeClr val="accent1"/>
-          </a:effectRef>
-          <a:fontRef idx="minor">
-            <a:schemeClr val="lt1"/>
-          </a:fontRef>
-        </p:style>
-        <p:txBody>
-          <a:bodyPr lIns="0" rIns="0" rtlCol="0" anchor="ctr"/>
-          <a:lstStyle/>
-          <a:p>
-            <a:pPr algn="ctr"/>
-            <a:r>
-              <a:rPr lang="en-US" sz="1100" dirty="0">
-                <a:solidFill>
-                  <a:schemeClr val="tx1"/>
-                </a:solidFill>
-                <a:latin typeface="Open Sauce Sans" pitchFamily="2" charset="77"/>
-              </a:rPr>
-              <a:t>Validation</a:t>
-            </a:r>
-          </a:p>
-        </p:txBody>
-      </p:sp>
-      <p:cxnSp>
-        <p:nvCxnSpPr>
-          <p:cNvPr id="18" name="Straight Arrow Connector 17">
-            <a:extLst>
-              <a:ext uri="{FF2B5EF4-FFF2-40B4-BE49-F238E27FC236}">
-                <a16:creationId xmlns:a16="http://schemas.microsoft.com/office/drawing/2014/main" id="{21EB47B6-3A86-53CA-40ED-42D93730C8EB}"/>
-              </a:ext>
-            </a:extLst>
-          </p:cNvPr>
-          <p:cNvCxnSpPr>
-            <a:cxnSpLocks/>
-            <a:stCxn id="10" idx="4"/>
-          </p:cNvCxnSpPr>
-          <p:nvPr/>
-        </p:nvCxnSpPr>
-        <p:spPr>
-          <a:xfrm flipH="1">
-            <a:off x="1398203" y="1932972"/>
-            <a:ext cx="437026" cy="452839"/>
-          </a:xfrm>
-          <a:prstGeom prst="straightConnector1">
-            <a:avLst/>
-          </a:prstGeom>
-          <a:ln>
-            <a:solidFill>
-              <a:schemeClr val="tx1"/>
-            </a:solidFill>
-            <a:tailEnd type="triangle"/>
-          </a:ln>
-        </p:spPr>
-        <p:style>
-          <a:lnRef idx="1">
-            <a:schemeClr val="accent1"/>
-          </a:lnRef>
-          <a:fillRef idx="0">
-            <a:schemeClr val="accent1"/>
-          </a:fillRef>
-          <a:effectRef idx="0">
-            <a:schemeClr val="accent1"/>
-          </a:effectRef>
-          <a:fontRef idx="minor">
-            <a:schemeClr val="tx1"/>
-          </a:fontRef>
-        </p:style>
-      </p:cxnSp>
-      <p:cxnSp>
-        <p:nvCxnSpPr>
-          <p:cNvPr id="21" name="Straight Arrow Connector 20">
-            <a:extLst>
-              <a:ext uri="{FF2B5EF4-FFF2-40B4-BE49-F238E27FC236}">
-                <a16:creationId xmlns:a16="http://schemas.microsoft.com/office/drawing/2014/main" id="{59D52875-0D27-5262-64E2-7055DCE26CF5}"/>
-              </a:ext>
-            </a:extLst>
-          </p:cNvPr>
-          <p:cNvCxnSpPr>
-            <a:cxnSpLocks/>
-          </p:cNvCxnSpPr>
-          <p:nvPr/>
-        </p:nvCxnSpPr>
-        <p:spPr>
-          <a:xfrm>
-            <a:off x="1832976" y="1932972"/>
-            <a:ext cx="437025" cy="452839"/>
-          </a:xfrm>
-          <a:prstGeom prst="straightConnector1">
-            <a:avLst/>
-          </a:prstGeom>
-          <a:ln>
-            <a:solidFill>
-              <a:schemeClr val="tx1"/>
-            </a:solidFill>
-            <a:tailEnd type="triangle"/>
-          </a:ln>
-        </p:spPr>
-        <p:style>
-          <a:lnRef idx="1">
-            <a:schemeClr val="accent1"/>
-          </a:lnRef>
-          <a:fillRef idx="0">
-            <a:schemeClr val="accent1"/>
-          </a:fillRef>
-          <a:effectRef idx="0">
-            <a:schemeClr val="accent1"/>
-          </a:effectRef>
-          <a:fontRef idx="minor">
-            <a:schemeClr val="tx1"/>
-          </a:fontRef>
-        </p:style>
-      </p:cxnSp>
-      <p:cxnSp>
-        <p:nvCxnSpPr>
-          <p:cNvPr id="24" name="Straight Arrow Connector 23">
-            <a:extLst>
-              <a:ext uri="{FF2B5EF4-FFF2-40B4-BE49-F238E27FC236}">
-                <a16:creationId xmlns:a16="http://schemas.microsoft.com/office/drawing/2014/main" id="{9C7C4CFA-6FF9-7CE0-B742-34308C53DD61}"/>
-              </a:ext>
-            </a:extLst>
-          </p:cNvPr>
-          <p:cNvCxnSpPr>
-            <a:cxnSpLocks/>
-            <a:endCxn id="16" idx="0"/>
-          </p:cNvCxnSpPr>
-          <p:nvPr/>
-        </p:nvCxnSpPr>
-        <p:spPr>
-          <a:xfrm flipH="1">
-            <a:off x="869024" y="3025891"/>
-            <a:ext cx="500964" cy="748157"/>
-          </a:xfrm>
-          <a:prstGeom prst="straightConnector1">
-            <a:avLst/>
-          </a:prstGeom>
-          <a:ln>
-            <a:solidFill>
-              <a:schemeClr val="tx1"/>
-            </a:solidFill>
-            <a:tailEnd type="triangle"/>
-          </a:ln>
-        </p:spPr>
-        <p:style>
-          <a:lnRef idx="1">
-            <a:schemeClr val="accent1"/>
-          </a:lnRef>
-          <a:fillRef idx="0">
-            <a:schemeClr val="accent1"/>
-          </a:fillRef>
-          <a:effectRef idx="0">
-            <a:schemeClr val="accent1"/>
-          </a:effectRef>
-          <a:fontRef idx="minor">
-            <a:schemeClr val="tx1"/>
-          </a:fontRef>
-        </p:style>
-      </p:cxnSp>
-      <p:cxnSp>
-        <p:nvCxnSpPr>
-          <p:cNvPr id="27" name="Straight Arrow Connector 26">
-            <a:extLst>
-              <a:ext uri="{FF2B5EF4-FFF2-40B4-BE49-F238E27FC236}">
-                <a16:creationId xmlns:a16="http://schemas.microsoft.com/office/drawing/2014/main" id="{A8976842-4374-5636-2398-34D529A3D957}"/>
-              </a:ext>
-            </a:extLst>
-          </p:cNvPr>
-          <p:cNvCxnSpPr>
-            <a:cxnSpLocks/>
-            <a:endCxn id="17" idx="0"/>
-          </p:cNvCxnSpPr>
-          <p:nvPr/>
-        </p:nvCxnSpPr>
-        <p:spPr>
-          <a:xfrm>
-            <a:off x="1384095" y="3038949"/>
-            <a:ext cx="489596" cy="735099"/>
-          </a:xfrm>
-          <a:prstGeom prst="straightConnector1">
-            <a:avLst/>
-          </a:prstGeom>
-          <a:ln>
-            <a:solidFill>
-              <a:schemeClr val="tx1"/>
-            </a:solidFill>
-            <a:tailEnd type="triangle"/>
-          </a:ln>
-        </p:spPr>
-        <p:style>
-          <a:lnRef idx="1">
-            <a:schemeClr val="accent1"/>
-          </a:lnRef>
-          <a:fillRef idx="0">
-            <a:schemeClr val="accent1"/>
-          </a:fillRef>
-          <a:effectRef idx="0">
-            <a:schemeClr val="accent1"/>
-          </a:effectRef>
-          <a:fontRef idx="minor">
-            <a:schemeClr val="tx1"/>
-          </a:fontRef>
-        </p:style>
-      </p:cxnSp>
+            </a:fontRef>
+          </p:style>
+        </p:cxnSp>
+      </p:grpSp>
     </p:spTree>
     <p:extLst>
       <p:ext uri="{BB962C8B-B14F-4D97-AF65-F5344CB8AC3E}">

</xml_diff>

<commit_message>
draft of day 1d
</commit_message>
<xml_diff>
--- a/figs/sw_figs.pptx
+++ b/figs/sw_figs.pptx
@@ -8,6 +8,7 @@
     <p:sldId id="256" r:id="rId2"/>
     <p:sldId id="257" r:id="rId3"/>
     <p:sldId id="258" r:id="rId4"/>
+    <p:sldId id="259" r:id="rId5"/>
   </p:sldIdLst>
   <p:sldSz cx="12192000" cy="6858000"/>
   <p:notesSz cx="6858000" cy="9144000"/>
@@ -5126,6 +5127,288 @@
 </p:sld>
 </file>
 
+<file path=ppt/slides/slide4.xml><?xml version="1.0" encoding="utf-8"?>
+<p:sld xmlns:a="http://schemas.openxmlformats.org/drawingml/2006/main" xmlns:r="http://schemas.openxmlformats.org/officeDocument/2006/relationships" xmlns:p="http://schemas.openxmlformats.org/presentationml/2006/main">
+  <p:cSld>
+    <p:spTree>
+      <p:nvGrpSpPr>
+        <p:cNvPr id="1" name=""/>
+        <p:cNvGrpSpPr/>
+        <p:nvPr/>
+      </p:nvGrpSpPr>
+      <p:grpSpPr>
+        <a:xfrm>
+          <a:off x="0" y="0"/>
+          <a:ext cx="0" cy="0"/>
+          <a:chOff x="0" y="0"/>
+          <a:chExt cx="0" cy="0"/>
+        </a:xfrm>
+      </p:grpSpPr>
+      <p:pic>
+        <p:nvPicPr>
+          <p:cNvPr id="5" name="Graphic 4" descr="Sparkling Heart outline">
+            <a:extLst>
+              <a:ext uri="{FF2B5EF4-FFF2-40B4-BE49-F238E27FC236}">
+                <a16:creationId xmlns:a16="http://schemas.microsoft.com/office/drawing/2014/main" id="{76B92FCA-2C40-1971-607B-9D84889F7E16}"/>
+              </a:ext>
+            </a:extLst>
+          </p:cNvPr>
+          <p:cNvPicPr>
+            <a:picLocks noChangeAspect="1"/>
+          </p:cNvPicPr>
+          <p:nvPr/>
+        </p:nvPicPr>
+        <p:blipFill>
+          <a:blip r:embed="rId2">
+            <a:extLst>
+              <a:ext uri="{96DAC541-7B7A-43D3-8B79-37D633B846F1}">
+                <asvg:svgBlip xmlns:asvg="http://schemas.microsoft.com/office/drawing/2016/SVG/main" r:embed="rId3"/>
+              </a:ext>
+            </a:extLst>
+          </a:blip>
+          <a:stretch>
+            <a:fillRect/>
+          </a:stretch>
+        </p:blipFill>
+        <p:spPr>
+          <a:xfrm>
+            <a:off x="5638800" y="2971800"/>
+            <a:ext cx="914400" cy="914400"/>
+          </a:xfrm>
+          <a:prstGeom prst="rect">
+            <a:avLst/>
+          </a:prstGeom>
+        </p:spPr>
+      </p:pic>
+      <p:pic>
+        <p:nvPicPr>
+          <p:cNvPr id="7" name="Graphic 6" descr="Two Hearts outline">
+            <a:extLst>
+              <a:ext uri="{FF2B5EF4-FFF2-40B4-BE49-F238E27FC236}">
+                <a16:creationId xmlns:a16="http://schemas.microsoft.com/office/drawing/2014/main" id="{E692C123-9F6E-1B7F-07FD-FB77D75892FD}"/>
+              </a:ext>
+            </a:extLst>
+          </p:cNvPr>
+          <p:cNvPicPr>
+            <a:picLocks noChangeAspect="1"/>
+          </p:cNvPicPr>
+          <p:nvPr/>
+        </p:nvPicPr>
+        <p:blipFill>
+          <a:blip r:embed="rId4">
+            <a:extLst>
+              <a:ext uri="{96DAC541-7B7A-43D3-8B79-37D633B846F1}">
+                <asvg:svgBlip xmlns:asvg="http://schemas.microsoft.com/office/drawing/2016/SVG/main" r:embed="rId5"/>
+              </a:ext>
+            </a:extLst>
+          </a:blip>
+          <a:stretch>
+            <a:fillRect/>
+          </a:stretch>
+        </p:blipFill>
+        <p:spPr>
+          <a:xfrm>
+            <a:off x="8333232" y="2654808"/>
+            <a:ext cx="914400" cy="914400"/>
+          </a:xfrm>
+          <a:prstGeom prst="rect">
+            <a:avLst/>
+          </a:prstGeom>
+        </p:spPr>
+      </p:pic>
+      <p:pic>
+        <p:nvPicPr>
+          <p:cNvPr id="9" name="Graphic 8" descr="Polaroid Pictures outline">
+            <a:extLst>
+              <a:ext uri="{FF2B5EF4-FFF2-40B4-BE49-F238E27FC236}">
+                <a16:creationId xmlns:a16="http://schemas.microsoft.com/office/drawing/2014/main" id="{D351D186-A787-0C22-E17C-BF7EFE726EAB}"/>
+              </a:ext>
+            </a:extLst>
+          </p:cNvPr>
+          <p:cNvPicPr>
+            <a:picLocks noChangeAspect="1"/>
+          </p:cNvPicPr>
+          <p:nvPr/>
+        </p:nvPicPr>
+        <p:blipFill>
+          <a:blip r:embed="rId6">
+            <a:extLst>
+              <a:ext uri="{96DAC541-7B7A-43D3-8B79-37D633B846F1}">
+                <asvg:svgBlip xmlns:asvg="http://schemas.microsoft.com/office/drawing/2016/SVG/main" r:embed="rId7"/>
+              </a:ext>
+            </a:extLst>
+          </a:blip>
+          <a:stretch>
+            <a:fillRect/>
+          </a:stretch>
+        </p:blipFill>
+        <p:spPr>
+          <a:xfrm>
+            <a:off x="1517904" y="2005584"/>
+            <a:ext cx="914400" cy="914400"/>
+          </a:xfrm>
+          <a:prstGeom prst="rect">
+            <a:avLst/>
+          </a:prstGeom>
+        </p:spPr>
+      </p:pic>
+      <p:pic>
+        <p:nvPicPr>
+          <p:cNvPr id="11" name="Graphic 10" descr="Skate outline">
+            <a:extLst>
+              <a:ext uri="{FF2B5EF4-FFF2-40B4-BE49-F238E27FC236}">
+                <a16:creationId xmlns:a16="http://schemas.microsoft.com/office/drawing/2014/main" id="{35DBFB76-DEC3-5721-9CEE-1F74C3F50D79}"/>
+              </a:ext>
+            </a:extLst>
+          </p:cNvPr>
+          <p:cNvPicPr>
+            <a:picLocks noChangeAspect="1"/>
+          </p:cNvPicPr>
+          <p:nvPr/>
+        </p:nvPicPr>
+        <p:blipFill>
+          <a:blip r:embed="rId8">
+            <a:extLst>
+              <a:ext uri="{96DAC541-7B7A-43D3-8B79-37D633B846F1}">
+                <asvg:svgBlip xmlns:asvg="http://schemas.microsoft.com/office/drawing/2016/SVG/main" r:embed="rId9"/>
+              </a:ext>
+            </a:extLst>
+          </a:blip>
+          <a:stretch>
+            <a:fillRect/>
+          </a:stretch>
+        </p:blipFill>
+        <p:spPr>
+          <a:xfrm>
+            <a:off x="6992112" y="1618488"/>
+            <a:ext cx="914400" cy="914400"/>
+          </a:xfrm>
+          <a:prstGeom prst="rect">
+            <a:avLst/>
+          </a:prstGeom>
+        </p:spPr>
+      </p:pic>
+      <p:pic>
+        <p:nvPicPr>
+          <p:cNvPr id="15" name="Graphic 14" descr="Remote learning science outline">
+            <a:extLst>
+              <a:ext uri="{FF2B5EF4-FFF2-40B4-BE49-F238E27FC236}">
+                <a16:creationId xmlns:a16="http://schemas.microsoft.com/office/drawing/2014/main" id="{91576B52-B062-AD4F-9B43-9BBA9DAE8EFF}"/>
+              </a:ext>
+            </a:extLst>
+          </p:cNvPr>
+          <p:cNvPicPr>
+            <a:picLocks noChangeAspect="1"/>
+          </p:cNvPicPr>
+          <p:nvPr/>
+        </p:nvPicPr>
+        <p:blipFill>
+          <a:blip r:embed="rId10">
+            <a:extLst>
+              <a:ext uri="{96DAC541-7B7A-43D3-8B79-37D633B846F1}">
+                <asvg:svgBlip xmlns:asvg="http://schemas.microsoft.com/office/drawing/2016/SVG/main" r:embed="rId11"/>
+              </a:ext>
+            </a:extLst>
+          </a:blip>
+          <a:stretch>
+            <a:fillRect/>
+          </a:stretch>
+        </p:blipFill>
+        <p:spPr>
+          <a:xfrm>
+            <a:off x="7065264" y="3703320"/>
+            <a:ext cx="914400" cy="914400"/>
+          </a:xfrm>
+          <a:prstGeom prst="rect">
+            <a:avLst/>
+          </a:prstGeom>
+        </p:spPr>
+      </p:pic>
+      <p:pic>
+        <p:nvPicPr>
+          <p:cNvPr id="17" name="Graphic 16" descr="Travel outline">
+            <a:extLst>
+              <a:ext uri="{FF2B5EF4-FFF2-40B4-BE49-F238E27FC236}">
+                <a16:creationId xmlns:a16="http://schemas.microsoft.com/office/drawing/2014/main" id="{5C8A4B18-EAE1-B096-5E2C-B6441764D3B8}"/>
+              </a:ext>
+            </a:extLst>
+          </p:cNvPr>
+          <p:cNvPicPr>
+            <a:picLocks noChangeAspect="1"/>
+          </p:cNvPicPr>
+          <p:nvPr/>
+        </p:nvPicPr>
+        <p:blipFill>
+          <a:blip r:embed="rId12">
+            <a:extLst>
+              <a:ext uri="{96DAC541-7B7A-43D3-8B79-37D633B846F1}">
+                <asvg:svgBlip xmlns:asvg="http://schemas.microsoft.com/office/drawing/2016/SVG/main" r:embed="rId13"/>
+              </a:ext>
+            </a:extLst>
+          </a:blip>
+          <a:stretch>
+            <a:fillRect/>
+          </a:stretch>
+        </p:blipFill>
+        <p:spPr>
+          <a:xfrm>
+            <a:off x="9759696" y="1161288"/>
+            <a:ext cx="914400" cy="914400"/>
+          </a:xfrm>
+          <a:prstGeom prst="rect">
+            <a:avLst/>
+          </a:prstGeom>
+        </p:spPr>
+      </p:pic>
+      <p:pic>
+        <p:nvPicPr>
+          <p:cNvPr id="19" name="Graphic 18" descr="Noodles outline">
+            <a:extLst>
+              <a:ext uri="{FF2B5EF4-FFF2-40B4-BE49-F238E27FC236}">
+                <a16:creationId xmlns:a16="http://schemas.microsoft.com/office/drawing/2014/main" id="{93F9F665-EF6F-229B-1C18-7BF594ACE84E}"/>
+              </a:ext>
+            </a:extLst>
+          </p:cNvPr>
+          <p:cNvPicPr>
+            <a:picLocks noChangeAspect="1"/>
+          </p:cNvPicPr>
+          <p:nvPr/>
+        </p:nvPicPr>
+        <p:blipFill>
+          <a:blip r:embed="rId14">
+            <a:extLst>
+              <a:ext uri="{96DAC541-7B7A-43D3-8B79-37D633B846F1}">
+                <asvg:svgBlip xmlns:asvg="http://schemas.microsoft.com/office/drawing/2016/SVG/main" r:embed="rId15"/>
+              </a:ext>
+            </a:extLst>
+          </a:blip>
+          <a:stretch>
+            <a:fillRect/>
+          </a:stretch>
+        </p:blipFill>
+        <p:spPr>
+          <a:xfrm>
+            <a:off x="10344912" y="3112008"/>
+            <a:ext cx="914400" cy="914400"/>
+          </a:xfrm>
+          <a:prstGeom prst="rect">
+            <a:avLst/>
+          </a:prstGeom>
+        </p:spPr>
+      </p:pic>
+    </p:spTree>
+    <p:extLst>
+      <p:ext uri="{BB962C8B-B14F-4D97-AF65-F5344CB8AC3E}">
+        <p14:creationId xmlns:p14="http://schemas.microsoft.com/office/powerpoint/2010/main" val="3315200068"/>
+      </p:ext>
+    </p:extLst>
+  </p:cSld>
+  <p:clrMapOvr>
+    <a:masterClrMapping/>
+  </p:clrMapOvr>
+</p:sld>
+</file>
+
 <file path=ppt/theme/theme1.xml><?xml version="1.0" encoding="utf-8"?>
 <a:theme xmlns:a="http://schemas.openxmlformats.org/drawingml/2006/main" name="Office Theme">
   <a:themeElements>

</xml_diff>